<commit_message>
erqrite of Arbiter/mem_mng_arbiter.vhd to support image manipulation mode added rd_wr_ctr.vhd to mem_mng_top.vhd update mds_top.vhd with new mem_mng_top.vhd
TO DO:
verify read/write operation via image manipulation mode
כלומר להריץ  סימולציה מלאה של הטופ:
לוודא שהמצבים בארביטר עוברים בהתאם לבקשות על הקווים 
icy_mem_mang_wbs....
לשים בסימולציה את כל הבלוקים שנגענו בהם ולראות איפה המידע נופל
</commit_message>
<xml_diff>
--- a/Presentation/top_diagrams_21_12_12.pptx
+++ b/Presentation/top_diagrams_21_12_12.pptx
@@ -288,7 +288,7 @@
           <a:p>
             <a:fld id="{36218667-1765-4D2D-BBD1-B458CBDA8D6E}" type="datetimeFigureOut">
               <a:rPr lang="he-IL" smtClean="0"/>
-              <a:t>ח'/טבת/תשע"ג</a:t>
+              <a:t>ט'/טבת/תשע"ג</a:t>
             </a:fld>
             <a:endParaRPr lang="he-IL"/>
           </a:p>
@@ -458,7 +458,7 @@
           <a:p>
             <a:fld id="{36218667-1765-4D2D-BBD1-B458CBDA8D6E}" type="datetimeFigureOut">
               <a:rPr lang="he-IL" smtClean="0"/>
-              <a:t>ח'/טבת/תשע"ג</a:t>
+              <a:t>ט'/טבת/תשע"ג</a:t>
             </a:fld>
             <a:endParaRPr lang="he-IL"/>
           </a:p>
@@ -638,7 +638,7 @@
           <a:p>
             <a:fld id="{36218667-1765-4D2D-BBD1-B458CBDA8D6E}" type="datetimeFigureOut">
               <a:rPr lang="he-IL" smtClean="0"/>
-              <a:t>ח'/טבת/תשע"ג</a:t>
+              <a:t>ט'/טבת/תשע"ג</a:t>
             </a:fld>
             <a:endParaRPr lang="he-IL"/>
           </a:p>
@@ -808,7 +808,7 @@
           <a:p>
             <a:fld id="{36218667-1765-4D2D-BBD1-B458CBDA8D6E}" type="datetimeFigureOut">
               <a:rPr lang="he-IL" smtClean="0"/>
-              <a:t>ח'/טבת/תשע"ג</a:t>
+              <a:t>ט'/טבת/תשע"ג</a:t>
             </a:fld>
             <a:endParaRPr lang="he-IL"/>
           </a:p>
@@ -1054,7 +1054,7 @@
           <a:p>
             <a:fld id="{36218667-1765-4D2D-BBD1-B458CBDA8D6E}" type="datetimeFigureOut">
               <a:rPr lang="he-IL" smtClean="0"/>
-              <a:t>ח'/טבת/תשע"ג</a:t>
+              <a:t>ט'/טבת/תשע"ג</a:t>
             </a:fld>
             <a:endParaRPr lang="he-IL"/>
           </a:p>
@@ -1342,7 +1342,7 @@
           <a:p>
             <a:fld id="{36218667-1765-4D2D-BBD1-B458CBDA8D6E}" type="datetimeFigureOut">
               <a:rPr lang="he-IL" smtClean="0"/>
-              <a:t>ח'/טבת/תשע"ג</a:t>
+              <a:t>ט'/טבת/תשע"ג</a:t>
             </a:fld>
             <a:endParaRPr lang="he-IL"/>
           </a:p>
@@ -1764,7 +1764,7 @@
           <a:p>
             <a:fld id="{36218667-1765-4D2D-BBD1-B458CBDA8D6E}" type="datetimeFigureOut">
               <a:rPr lang="he-IL" smtClean="0"/>
-              <a:t>ח'/טבת/תשע"ג</a:t>
+              <a:t>ט'/טבת/תשע"ג</a:t>
             </a:fld>
             <a:endParaRPr lang="he-IL"/>
           </a:p>
@@ -1882,7 +1882,7 @@
           <a:p>
             <a:fld id="{36218667-1765-4D2D-BBD1-B458CBDA8D6E}" type="datetimeFigureOut">
               <a:rPr lang="he-IL" smtClean="0"/>
-              <a:t>ח'/טבת/תשע"ג</a:t>
+              <a:t>ט'/טבת/תשע"ג</a:t>
             </a:fld>
             <a:endParaRPr lang="he-IL"/>
           </a:p>
@@ -1977,7 +1977,7 @@
           <a:p>
             <a:fld id="{36218667-1765-4D2D-BBD1-B458CBDA8D6E}" type="datetimeFigureOut">
               <a:rPr lang="he-IL" smtClean="0"/>
-              <a:t>ח'/טבת/תשע"ג</a:t>
+              <a:t>ט'/טבת/תשע"ג</a:t>
             </a:fld>
             <a:endParaRPr lang="he-IL"/>
           </a:p>
@@ -2254,7 +2254,7 @@
           <a:p>
             <a:fld id="{36218667-1765-4D2D-BBD1-B458CBDA8D6E}" type="datetimeFigureOut">
               <a:rPr lang="he-IL" smtClean="0"/>
-              <a:t>ח'/טבת/תשע"ג</a:t>
+              <a:t>ט'/טבת/תשע"ג</a:t>
             </a:fld>
             <a:endParaRPr lang="he-IL"/>
           </a:p>
@@ -2507,7 +2507,7 @@
           <a:p>
             <a:fld id="{36218667-1765-4D2D-BBD1-B458CBDA8D6E}" type="datetimeFigureOut">
               <a:rPr lang="he-IL" smtClean="0"/>
-              <a:t>ח'/טבת/תשע"ג</a:t>
+              <a:t>ט'/טבת/תשע"ג</a:t>
             </a:fld>
             <a:endParaRPr lang="he-IL"/>
           </a:p>
@@ -2720,7 +2720,7 @@
           <a:p>
             <a:fld id="{36218667-1765-4D2D-BBD1-B458CBDA8D6E}" type="datetimeFigureOut">
               <a:rPr lang="he-IL" smtClean="0"/>
-              <a:t>ח'/טבת/תשע"ג</a:t>
+              <a:t>ט'/טבת/תשע"ג</a:t>
             </a:fld>
             <a:endParaRPr lang="he-IL"/>
           </a:p>
@@ -10840,45 +10840,6 @@
       </p:sp>
       <p:cxnSp>
         <p:nvCxnSpPr>
-          <p:cNvPr id="218" name="Shape 20"/>
-          <p:cNvCxnSpPr>
-            <a:stCxn id="216" idx="1"/>
-            <a:endCxn id="70" idx="3"/>
-          </p:cNvCxnSpPr>
-          <p:nvPr/>
-        </p:nvCxnSpPr>
-        <p:spPr>
-          <a:xfrm rot="10800000">
-            <a:off x="2267744" y="4167522"/>
-            <a:ext cx="792088" cy="297610"/>
-          </a:xfrm>
-          <a:prstGeom prst="bentConnector3">
-            <a:avLst>
-              <a:gd name="adj1" fmla="val 50000"/>
-            </a:avLst>
-          </a:prstGeom>
-          <a:ln>
-            <a:headEnd type="arrow"/>
-            <a:tailEnd type="arrow"/>
-          </a:ln>
-        </p:spPr>
-        <p:style>
-          <a:lnRef idx="2">
-            <a:schemeClr val="dk1"/>
-          </a:lnRef>
-          <a:fillRef idx="0">
-            <a:schemeClr val="dk1"/>
-          </a:fillRef>
-          <a:effectRef idx="1">
-            <a:schemeClr val="dk1"/>
-          </a:effectRef>
-          <a:fontRef idx="minor">
-            <a:schemeClr val="tx1"/>
-          </a:fontRef>
-        </p:style>
-      </p:cxnSp>
-      <p:cxnSp>
-        <p:nvCxnSpPr>
           <p:cNvPr id="222" name="Elbow Connector 221"/>
           <p:cNvCxnSpPr>
             <a:endCxn id="212" idx="2"/>
@@ -10971,10 +10932,46 @@
               <a:rPr lang="he-IL" sz="1200" dirty="0"/>
               <a:t>7</a:t>
             </a:r>
-            <a:endParaRPr lang="he-IL" sz="1200" dirty="0"/>
-          </a:p>
-        </p:txBody>
-      </p:sp>
+          </a:p>
+        </p:txBody>
+      </p:sp>
+      <p:cxnSp>
+        <p:nvCxnSpPr>
+          <p:cNvPr id="4" name="Straight Arrow Connector 3"/>
+          <p:cNvCxnSpPr>
+            <a:stCxn id="70" idx="3"/>
+            <a:endCxn id="216" idx="1"/>
+          </p:cNvCxnSpPr>
+          <p:nvPr/>
+        </p:nvCxnSpPr>
+        <p:spPr>
+          <a:xfrm>
+            <a:off x="2267744" y="4167522"/>
+            <a:ext cx="792088" cy="297610"/>
+          </a:xfrm>
+          <a:prstGeom prst="straightConnector1">
+            <a:avLst/>
+          </a:prstGeom>
+          <a:ln>
+            <a:headEnd type="arrow"/>
+            <a:tailEnd type="arrow"/>
+          </a:ln>
+        </p:spPr>
+        <p:style>
+          <a:lnRef idx="2">
+            <a:schemeClr val="dk1"/>
+          </a:lnRef>
+          <a:fillRef idx="0">
+            <a:schemeClr val="dk1"/>
+          </a:fillRef>
+          <a:effectRef idx="1">
+            <a:schemeClr val="dk1"/>
+          </a:effectRef>
+          <a:fontRef idx="minor">
+            <a:schemeClr val="tx1"/>
+          </a:fontRef>
+        </p:style>
+      </p:cxnSp>
     </p:spTree>
     <p:extLst>
       <p:ext uri="{BB962C8B-B14F-4D97-AF65-F5344CB8AC3E}">

</xml_diff>